<commit_message>
fixed names in alphabetical order
</commit_message>
<xml_diff>
--- a/FinalPowerpoint.pptx
+++ b/FinalPowerpoint.pptx
@@ -4297,21 +4297,34 @@
           <a:p>
             <a:r>
               <a:rPr lang="en-US" dirty="0" smtClean="0"/>
-              <a:t>Joshua Rand</a:t>
-            </a:r>
-          </a:p>
-          <a:p>
+              <a:t>Joshua </a:t>
+            </a:r>
             <a:r>
               <a:rPr lang="en-US" dirty="0" smtClean="0"/>
-              <a:t>Kelley Stoll</a:t>
-            </a:r>
-          </a:p>
-          <a:p>
+              <a:t>Rand</a:t>
+            </a:r>
+          </a:p>
+          <a:p>
+            <a:r>
+              <a:rPr lang="en-US" dirty="0"/>
+              <a:t>Michael Santo Jr</a:t>
+            </a:r>
             <a:r>
               <a:rPr lang="en-US" dirty="0" smtClean="0"/>
-              <a:t>Michael Santo Jr.</a:t>
-            </a:r>
-            <a:endParaRPr lang="en-US" dirty="0"/>
+              <a:t>.</a:t>
+            </a:r>
+            <a:endParaRPr lang="en-US" dirty="0" smtClean="0"/>
+          </a:p>
+          <a:p>
+            <a:r>
+              <a:rPr lang="en-US" dirty="0" smtClean="0"/>
+              <a:t>Kelley </a:t>
+            </a:r>
+            <a:r>
+              <a:rPr lang="en-US" dirty="0" smtClean="0"/>
+              <a:t>Stoll</a:t>
+            </a:r>
+            <a:endParaRPr lang="en-US" dirty="0" smtClean="0"/>
           </a:p>
         </p:txBody>
       </p:sp>
@@ -5261,7 +5274,6 @@
               <a:rPr lang="en-US" dirty="0"/>
               <a:t>http://www.youtube-mp3.org/</a:t>
             </a:r>
-            <a:endParaRPr lang="en-US" dirty="0"/>
           </a:p>
         </p:txBody>
       </p:sp>
@@ -5658,13 +5670,8 @@
             </a:pPr>
             <a:r>
               <a:rPr lang="en-US" sz="2000" dirty="0" smtClean="0"/>
-              <a:t>Generate random mine field, numbers correspond with number of adjacent bombs, check for surrounding mines and prevent tiles from being surrounded by mines (if possible</a:t>
-            </a:r>
-            <a:r>
-              <a:rPr lang="en-US" sz="2000" dirty="0" smtClean="0"/>
-              <a:t>)</a:t>
-            </a:r>
-            <a:endParaRPr lang="en-US" sz="2000" dirty="0" smtClean="0"/>
+              <a:t>Generate random mine field, numbers correspond with number of adjacent bombs, check for surrounding mines and prevent tiles from being surrounded by mines (if possible)</a:t>
+            </a:r>
           </a:p>
         </p:txBody>
       </p:sp>

</xml_diff>